<commit_message>
PID to PD on presenation
</commit_message>
<xml_diff>
--- a/Presentation Video - Group 6 Project 6.pptx
+++ b/Presentation Video - Group 6 Project 6.pptx
@@ -113,7 +113,56 @@
       </a:defRPr>
     </a:lvl9pPr>
   </p:defaultTextStyle>
+  <p:extLst>
+    <p:ext uri="{EFAFB233-063F-42B5-8137-9DF3F51BA10A}">
+      <p15:sldGuideLst xmlns:p15="http://schemas.microsoft.com/office/powerpoint/2012/main"/>
+    </p:ext>
+  </p:extLst>
 </p:presentation>
+</file>
+
+<file path=ppt/changesInfos/changesInfo1.xml><?xml version="1.0" encoding="utf-8"?>
+<pc:chgInfo xmlns:a="http://schemas.openxmlformats.org/drawingml/2006/main" xmlns:r="http://schemas.openxmlformats.org/officeDocument/2006/relationships" xmlns:ac="http://schemas.microsoft.com/office/drawing/2013/main/command" xmlns:pc="http://schemas.microsoft.com/office/powerpoint/2013/main/command">
+  <pc:docChgLst>
+    <pc:chgData name="Matthew Egan" userId="5596f977-76dd-46f0-9516-79013d85402f" providerId="ADAL" clId="{B2427CCA-548A-435A-8791-F7BC1A94C25A}"/>
+    <pc:docChg chg="modSld">
+      <pc:chgData name="Matthew Egan" userId="5596f977-76dd-46f0-9516-79013d85402f" providerId="ADAL" clId="{B2427CCA-548A-435A-8791-F7BC1A94C25A}" dt="2023-10-26T01:36:16.305" v="1" actId="20577"/>
+      <pc:docMkLst>
+        <pc:docMk/>
+      </pc:docMkLst>
+      <pc:sldChg chg="modSp mod">
+        <pc:chgData name="Matthew Egan" userId="5596f977-76dd-46f0-9516-79013d85402f" providerId="ADAL" clId="{B2427CCA-548A-435A-8791-F7BC1A94C25A}" dt="2023-10-26T01:36:16.305" v="1" actId="20577"/>
+        <pc:sldMkLst>
+          <pc:docMk/>
+          <pc:sldMk cId="152898728" sldId="259"/>
+        </pc:sldMkLst>
+        <pc:spChg chg="mod">
+          <ac:chgData name="Matthew Egan" userId="5596f977-76dd-46f0-9516-79013d85402f" providerId="ADAL" clId="{B2427CCA-548A-435A-8791-F7BC1A94C25A}" dt="2023-10-26T01:36:16.305" v="1" actId="20577"/>
+          <ac:spMkLst>
+            <pc:docMk/>
+            <pc:sldMk cId="152898728" sldId="259"/>
+            <ac:spMk id="3" creationId="{35C79D26-939F-F5E9-81BC-0CC367E0AD46}"/>
+          </ac:spMkLst>
+        </pc:spChg>
+      </pc:sldChg>
+      <pc:sldChg chg="modSp mod">
+        <pc:chgData name="Matthew Egan" userId="5596f977-76dd-46f0-9516-79013d85402f" providerId="ADAL" clId="{B2427CCA-548A-435A-8791-F7BC1A94C25A}" dt="2023-10-26T01:36:11.359" v="0" actId="20577"/>
+        <pc:sldMkLst>
+          <pc:docMk/>
+          <pc:sldMk cId="1907575354" sldId="260"/>
+        </pc:sldMkLst>
+        <pc:spChg chg="mod">
+          <ac:chgData name="Matthew Egan" userId="5596f977-76dd-46f0-9516-79013d85402f" providerId="ADAL" clId="{B2427CCA-548A-435A-8791-F7BC1A94C25A}" dt="2023-10-26T01:36:11.359" v="0" actId="20577"/>
+          <ac:spMkLst>
+            <pc:docMk/>
+            <pc:sldMk cId="1907575354" sldId="260"/>
+            <ac:spMk id="3" creationId="{0BDFAA85-6C9A-436F-514A-71B90FDF3C1D}"/>
+          </ac:spMkLst>
+        </pc:spChg>
+      </pc:sldChg>
+    </pc:docChg>
+  </pc:docChgLst>
+</pc:chgInfo>
 </file>
 
 <file path=ppt/slideLayouts/slideLayout1.xml><?xml version="1.0" encoding="utf-8"?>
@@ -173,7 +222,7 @@
           <a:noFill/>
           <a:extLst>
             <a:ext uri="{909E8E84-426E-40dd-AFC4-6F175D3DCCD1}">
-              <a14:hiddenFill xmlns:a14="http://schemas.microsoft.com/office/drawing/2010/main" xmlns="">
+              <a14:hiddenFill xmlns="" xmlns:a14="http://schemas.microsoft.com/office/drawing/2010/main">
                 <a:solidFill>
                   <a:srgbClr val="FFFFFF"/>
                 </a:solidFill>
@@ -232,7 +281,7 @@
             </a:ln>
             <a:extLst>
               <a:ext uri="{91240B29-F687-4f45-9708-019B960494DF}">
-                <a14:hiddenLine xmlns:a14="http://schemas.microsoft.com/office/drawing/2010/main" xmlns="" w="9525">
+                <a14:hiddenLine xmlns="" xmlns:a14="http://schemas.microsoft.com/office/drawing/2010/main" w="9525">
                   <a:solidFill>
                     <a:srgbClr val="000000"/>
                   </a:solidFill>
@@ -322,7 +371,7 @@
             </a:ln>
             <a:extLst>
               <a:ext uri="{91240B29-F687-4f45-9708-019B960494DF}">
-                <a14:hiddenLine xmlns:a14="http://schemas.microsoft.com/office/drawing/2010/main" xmlns="" w="9525">
+                <a14:hiddenLine xmlns="" xmlns:a14="http://schemas.microsoft.com/office/drawing/2010/main" w="9525">
                   <a:solidFill>
                     <a:srgbClr val="000000"/>
                   </a:solidFill>
@@ -412,7 +461,7 @@
             </a:ln>
             <a:extLst>
               <a:ext uri="{91240B29-F687-4f45-9708-019B960494DF}">
-                <a14:hiddenLine xmlns:a14="http://schemas.microsoft.com/office/drawing/2010/main" xmlns="" w="9525">
+                <a14:hiddenLine xmlns="" xmlns:a14="http://schemas.microsoft.com/office/drawing/2010/main" w="9525">
                   <a:solidFill>
                     <a:srgbClr val="000000"/>
                   </a:solidFill>
@@ -446,7 +495,7 @@
             </a:ln>
             <a:extLst>
               <a:ext uri="{91240B29-F687-4f45-9708-019B960494DF}">
-                <a14:hiddenLine xmlns:a14="http://schemas.microsoft.com/office/drawing/2010/main" xmlns="" w="9525">
+                <a14:hiddenLine xmlns="" xmlns:a14="http://schemas.microsoft.com/office/drawing/2010/main" w="9525">
                   <a:solidFill>
                     <a:srgbClr val="000000"/>
                   </a:solidFill>
@@ -536,7 +585,7 @@
             </a:ln>
             <a:extLst>
               <a:ext uri="{91240B29-F687-4f45-9708-019B960494DF}">
-                <a14:hiddenLine xmlns:a14="http://schemas.microsoft.com/office/drawing/2010/main" xmlns="" w="9525">
+                <a14:hiddenLine xmlns="" xmlns:a14="http://schemas.microsoft.com/office/drawing/2010/main" w="9525">
                   <a:solidFill>
                     <a:srgbClr val="000000"/>
                   </a:solidFill>
@@ -598,7 +647,7 @@
             </a:ln>
             <a:extLst>
               <a:ext uri="{91240B29-F687-4f45-9708-019B960494DF}">
-                <a14:hiddenLine xmlns:a14="http://schemas.microsoft.com/office/drawing/2010/main" xmlns="" w="9525">
+                <a14:hiddenLine xmlns="" xmlns:a14="http://schemas.microsoft.com/office/drawing/2010/main" w="9525">
                   <a:solidFill>
                     <a:srgbClr val="000000"/>
                   </a:solidFill>
@@ -660,7 +709,7 @@
             </a:ln>
             <a:extLst>
               <a:ext uri="{91240B29-F687-4f45-9708-019B960494DF}">
-                <a14:hiddenLine xmlns:a14="http://schemas.microsoft.com/office/drawing/2010/main" xmlns="" w="9525">
+                <a14:hiddenLine xmlns="" xmlns:a14="http://schemas.microsoft.com/office/drawing/2010/main" w="9525">
                   <a:solidFill>
                     <a:srgbClr val="000000"/>
                   </a:solidFill>
@@ -750,7 +799,7 @@
             </a:ln>
             <a:extLst>
               <a:ext uri="{91240B29-F687-4f45-9708-019B960494DF}">
-                <a14:hiddenLine xmlns:a14="http://schemas.microsoft.com/office/drawing/2010/main" xmlns="" w="9525">
+                <a14:hiddenLine xmlns="" xmlns:a14="http://schemas.microsoft.com/office/drawing/2010/main" w="9525">
                   <a:solidFill>
                     <a:srgbClr val="000000"/>
                   </a:solidFill>
@@ -812,7 +861,7 @@
             </a:ln>
             <a:extLst>
               <a:ext uri="{91240B29-F687-4f45-9708-019B960494DF}">
-                <a14:hiddenLine xmlns:a14="http://schemas.microsoft.com/office/drawing/2010/main" xmlns="" w="9525">
+                <a14:hiddenLine xmlns="" xmlns:a14="http://schemas.microsoft.com/office/drawing/2010/main" w="9525">
                   <a:solidFill>
                     <a:srgbClr val="000000"/>
                   </a:solidFill>
@@ -874,7 +923,7 @@
             </a:ln>
             <a:extLst>
               <a:ext uri="{91240B29-F687-4f45-9708-019B960494DF}">
-                <a14:hiddenLine xmlns:a14="http://schemas.microsoft.com/office/drawing/2010/main" xmlns="" w="9525">
+                <a14:hiddenLine xmlns="" xmlns:a14="http://schemas.microsoft.com/office/drawing/2010/main" w="9525">
                   <a:solidFill>
                     <a:srgbClr val="000000"/>
                   </a:solidFill>
@@ -964,7 +1013,7 @@
             </a:ln>
             <a:extLst>
               <a:ext uri="{91240B29-F687-4f45-9708-019B960494DF}">
-                <a14:hiddenLine xmlns:a14="http://schemas.microsoft.com/office/drawing/2010/main" xmlns="" w="9525">
+                <a14:hiddenLine xmlns="" xmlns:a14="http://schemas.microsoft.com/office/drawing/2010/main" w="9525">
                   <a:solidFill>
                     <a:srgbClr val="000000"/>
                   </a:solidFill>
@@ -1054,7 +1103,7 @@
             </a:ln>
             <a:extLst>
               <a:ext uri="{91240B29-F687-4f45-9708-019B960494DF}">
-                <a14:hiddenLine xmlns:a14="http://schemas.microsoft.com/office/drawing/2010/main" xmlns="" w="9525">
+                <a14:hiddenLine xmlns="" xmlns:a14="http://schemas.microsoft.com/office/drawing/2010/main" w="9525">
                   <a:solidFill>
                     <a:srgbClr val="000000"/>
                   </a:solidFill>
@@ -1116,7 +1165,7 @@
             </a:ln>
             <a:extLst>
               <a:ext uri="{91240B29-F687-4f45-9708-019B960494DF}">
-                <a14:hiddenLine xmlns:a14="http://schemas.microsoft.com/office/drawing/2010/main" xmlns="" w="9525">
+                <a14:hiddenLine xmlns="" xmlns:a14="http://schemas.microsoft.com/office/drawing/2010/main" w="9525">
                   <a:solidFill>
                     <a:srgbClr val="000000"/>
                   </a:solidFill>
@@ -1226,7 +1275,7 @@
             </a:ln>
             <a:extLst>
               <a:ext uri="{91240B29-F687-4f45-9708-019B960494DF}">
-                <a14:hiddenLine xmlns:a14="http://schemas.microsoft.com/office/drawing/2010/main" xmlns="" w="9525">
+                <a14:hiddenLine xmlns="" xmlns:a14="http://schemas.microsoft.com/office/drawing/2010/main" w="9525">
                   <a:solidFill>
                     <a:srgbClr val="000000"/>
                   </a:solidFill>
@@ -1288,7 +1337,7 @@
             </a:ln>
             <a:extLst>
               <a:ext uri="{91240B29-F687-4f45-9708-019B960494DF}">
-                <a14:hiddenLine xmlns:a14="http://schemas.microsoft.com/office/drawing/2010/main" xmlns="" w="9525">
+                <a14:hiddenLine xmlns="" xmlns:a14="http://schemas.microsoft.com/office/drawing/2010/main" w="9525">
                   <a:solidFill>
                     <a:srgbClr val="000000"/>
                   </a:solidFill>
@@ -1378,7 +1427,7 @@
             </a:ln>
             <a:extLst>
               <a:ext uri="{91240B29-F687-4f45-9708-019B960494DF}">
-                <a14:hiddenLine xmlns:a14="http://schemas.microsoft.com/office/drawing/2010/main" xmlns="" w="9525">
+                <a14:hiddenLine xmlns="" xmlns:a14="http://schemas.microsoft.com/office/drawing/2010/main" w="9525">
                   <a:solidFill>
                     <a:srgbClr val="000000"/>
                   </a:solidFill>
@@ -1468,7 +1517,7 @@
             </a:ln>
             <a:extLst>
               <a:ext uri="{91240B29-F687-4f45-9708-019B960494DF}">
-                <a14:hiddenLine xmlns:a14="http://schemas.microsoft.com/office/drawing/2010/main" xmlns="" w="9525">
+                <a14:hiddenLine xmlns="" xmlns:a14="http://schemas.microsoft.com/office/drawing/2010/main" w="9525">
                   <a:solidFill>
                     <a:srgbClr val="000000"/>
                   </a:solidFill>
@@ -1530,7 +1579,7 @@
             </a:ln>
             <a:extLst>
               <a:ext uri="{91240B29-F687-4f45-9708-019B960494DF}">
-                <a14:hiddenLine xmlns:a14="http://schemas.microsoft.com/office/drawing/2010/main" xmlns="" w="9525">
+                <a14:hiddenLine xmlns="" xmlns:a14="http://schemas.microsoft.com/office/drawing/2010/main" w="9525">
                   <a:solidFill>
                     <a:srgbClr val="000000"/>
                   </a:solidFill>
@@ -1620,7 +1669,7 @@
             </a:ln>
             <a:extLst>
               <a:ext uri="{91240B29-F687-4f45-9708-019B960494DF}">
-                <a14:hiddenLine xmlns:a14="http://schemas.microsoft.com/office/drawing/2010/main" xmlns="" w="9525">
+                <a14:hiddenLine xmlns="" xmlns:a14="http://schemas.microsoft.com/office/drawing/2010/main" w="9525">
                   <a:solidFill>
                     <a:srgbClr val="000000"/>
                   </a:solidFill>
@@ -1710,7 +1759,7 @@
             </a:ln>
             <a:extLst>
               <a:ext uri="{91240B29-F687-4f45-9708-019B960494DF}">
-                <a14:hiddenLine xmlns:a14="http://schemas.microsoft.com/office/drawing/2010/main" xmlns="" w="9525">
+                <a14:hiddenLine xmlns="" xmlns:a14="http://schemas.microsoft.com/office/drawing/2010/main" w="9525">
                   <a:solidFill>
                     <a:srgbClr val="000000"/>
                   </a:solidFill>
@@ -1766,7 +1815,7 @@
             </a:ln>
             <a:extLst>
               <a:ext uri="{91240B29-F687-4f45-9708-019B960494DF}">
-                <a14:hiddenLine xmlns:a14="http://schemas.microsoft.com/office/drawing/2010/main" xmlns="" w="9525">
+                <a14:hiddenLine xmlns="" xmlns:a14="http://schemas.microsoft.com/office/drawing/2010/main" w="9525">
                   <a:solidFill>
                     <a:srgbClr val="000000"/>
                   </a:solidFill>
@@ -1856,7 +1905,7 @@
             </a:ln>
             <a:extLst>
               <a:ext uri="{91240B29-F687-4f45-9708-019B960494DF}">
-                <a14:hiddenLine xmlns:a14="http://schemas.microsoft.com/office/drawing/2010/main" xmlns="" w="9525">
+                <a14:hiddenLine xmlns="" xmlns:a14="http://schemas.microsoft.com/office/drawing/2010/main" w="9525">
                   <a:solidFill>
                     <a:srgbClr val="000000"/>
                   </a:solidFill>
@@ -1912,7 +1961,7 @@
             </a:ln>
             <a:extLst>
               <a:ext uri="{91240B29-F687-4f45-9708-019B960494DF}">
-                <a14:hiddenLine xmlns:a14="http://schemas.microsoft.com/office/drawing/2010/main" xmlns="" w="9525">
+                <a14:hiddenLine xmlns="" xmlns:a14="http://schemas.microsoft.com/office/drawing/2010/main" w="9525">
                   <a:solidFill>
                     <a:srgbClr val="000000"/>
                   </a:solidFill>
@@ -2002,7 +2051,7 @@
             </a:ln>
             <a:extLst>
               <a:ext uri="{91240B29-F687-4f45-9708-019B960494DF}">
-                <a14:hiddenLine xmlns:a14="http://schemas.microsoft.com/office/drawing/2010/main" xmlns="" w="9525">
+                <a14:hiddenLine xmlns="" xmlns:a14="http://schemas.microsoft.com/office/drawing/2010/main" w="9525">
                   <a:solidFill>
                     <a:srgbClr val="000000"/>
                   </a:solidFill>
@@ -2070,7 +2119,7 @@
             </a:ln>
             <a:extLst>
               <a:ext uri="{91240B29-F687-4f45-9708-019B960494DF}">
-                <a14:hiddenLine xmlns:a14="http://schemas.microsoft.com/office/drawing/2010/main" xmlns="" w="9525">
+                <a14:hiddenLine xmlns="" xmlns:a14="http://schemas.microsoft.com/office/drawing/2010/main" w="9525">
                   <a:solidFill>
                     <a:srgbClr val="000000"/>
                   </a:solidFill>
@@ -2160,7 +2209,7 @@
             </a:ln>
             <a:extLst>
               <a:ext uri="{91240B29-F687-4f45-9708-019B960494DF}">
-                <a14:hiddenLine xmlns:a14="http://schemas.microsoft.com/office/drawing/2010/main" xmlns="" w="9525">
+                <a14:hiddenLine xmlns="" xmlns:a14="http://schemas.microsoft.com/office/drawing/2010/main" w="9525">
                   <a:solidFill>
                     <a:srgbClr val="000000"/>
                   </a:solidFill>
@@ -2228,7 +2277,7 @@
             </a:ln>
             <a:extLst>
               <a:ext uri="{91240B29-F687-4f45-9708-019B960494DF}">
-                <a14:hiddenLine xmlns:a14="http://schemas.microsoft.com/office/drawing/2010/main" xmlns="" w="9525">
+                <a14:hiddenLine xmlns="" xmlns:a14="http://schemas.microsoft.com/office/drawing/2010/main" w="9525">
                   <a:solidFill>
                     <a:srgbClr val="000000"/>
                   </a:solidFill>
@@ -2318,7 +2367,7 @@
             </a:ln>
             <a:extLst>
               <a:ext uri="{91240B29-F687-4f45-9708-019B960494DF}">
-                <a14:hiddenLine xmlns:a14="http://schemas.microsoft.com/office/drawing/2010/main" xmlns="" w="9525">
+                <a14:hiddenLine xmlns="" xmlns:a14="http://schemas.microsoft.com/office/drawing/2010/main" w="9525">
                   <a:solidFill>
                     <a:srgbClr val="000000"/>
                   </a:solidFill>
@@ -2352,7 +2401,7 @@
             </a:ln>
             <a:extLst>
               <a:ext uri="{91240B29-F687-4f45-9708-019B960494DF}">
-                <a14:hiddenLine xmlns:a14="http://schemas.microsoft.com/office/drawing/2010/main" xmlns="" w="9525">
+                <a14:hiddenLine xmlns="" xmlns:a14="http://schemas.microsoft.com/office/drawing/2010/main" w="9525">
                   <a:solidFill>
                     <a:srgbClr val="000000"/>
                   </a:solidFill>
@@ -2442,7 +2491,7 @@
             </a:ln>
             <a:extLst>
               <a:ext uri="{91240B29-F687-4f45-9708-019B960494DF}">
-                <a14:hiddenLine xmlns:a14="http://schemas.microsoft.com/office/drawing/2010/main" xmlns="" w="9525">
+                <a14:hiddenLine xmlns="" xmlns:a14="http://schemas.microsoft.com/office/drawing/2010/main" w="9525">
                   <a:solidFill>
                     <a:srgbClr val="000000"/>
                   </a:solidFill>
@@ -2504,7 +2553,7 @@
             </a:ln>
             <a:extLst>
               <a:ext uri="{91240B29-F687-4f45-9708-019B960494DF}">
-                <a14:hiddenLine xmlns:a14="http://schemas.microsoft.com/office/drawing/2010/main" xmlns="" w="9525">
+                <a14:hiddenLine xmlns="" xmlns:a14="http://schemas.microsoft.com/office/drawing/2010/main" w="9525">
                   <a:solidFill>
                     <a:srgbClr val="000000"/>
                   </a:solidFill>
@@ -2566,7 +2615,7 @@
             </a:ln>
             <a:extLst>
               <a:ext uri="{91240B29-F687-4f45-9708-019B960494DF}">
-                <a14:hiddenLine xmlns:a14="http://schemas.microsoft.com/office/drawing/2010/main" xmlns="" w="9525">
+                <a14:hiddenLine xmlns="" xmlns:a14="http://schemas.microsoft.com/office/drawing/2010/main" w="9525">
                   <a:solidFill>
                     <a:srgbClr val="000000"/>
                   </a:solidFill>
@@ -2656,7 +2705,7 @@
             </a:ln>
             <a:extLst>
               <a:ext uri="{91240B29-F687-4f45-9708-019B960494DF}">
-                <a14:hiddenLine xmlns:a14="http://schemas.microsoft.com/office/drawing/2010/main" xmlns="" w="9525">
+                <a14:hiddenLine xmlns="" xmlns:a14="http://schemas.microsoft.com/office/drawing/2010/main" w="9525">
                   <a:solidFill>
                     <a:srgbClr val="000000"/>
                   </a:solidFill>
@@ -2724,7 +2773,7 @@
             </a:ln>
             <a:extLst>
               <a:ext uri="{91240B29-F687-4f45-9708-019B960494DF}">
-                <a14:hiddenLine xmlns:a14="http://schemas.microsoft.com/office/drawing/2010/main" xmlns="" w="9525">
+                <a14:hiddenLine xmlns="" xmlns:a14="http://schemas.microsoft.com/office/drawing/2010/main" w="9525">
                   <a:solidFill>
                     <a:srgbClr val="000000"/>
                   </a:solidFill>
@@ -2786,7 +2835,7 @@
             </a:ln>
             <a:extLst>
               <a:ext uri="{91240B29-F687-4f45-9708-019B960494DF}">
-                <a14:hiddenLine xmlns:a14="http://schemas.microsoft.com/office/drawing/2010/main" xmlns="" w="9525">
+                <a14:hiddenLine xmlns="" xmlns:a14="http://schemas.microsoft.com/office/drawing/2010/main" w="9525">
                   <a:solidFill>
                     <a:srgbClr val="000000"/>
                   </a:solidFill>
@@ -2876,7 +2925,7 @@
             </a:ln>
             <a:extLst>
               <a:ext uri="{91240B29-F687-4f45-9708-019B960494DF}">
-                <a14:hiddenLine xmlns:a14="http://schemas.microsoft.com/office/drawing/2010/main" xmlns="" w="9525">
+                <a14:hiddenLine xmlns="" xmlns:a14="http://schemas.microsoft.com/office/drawing/2010/main" w="9525">
                   <a:solidFill>
                     <a:srgbClr val="000000"/>
                   </a:solidFill>
@@ -2938,7 +2987,7 @@
             </a:ln>
             <a:extLst>
               <a:ext uri="{91240B29-F687-4f45-9708-019B960494DF}">
-                <a14:hiddenLine xmlns:a14="http://schemas.microsoft.com/office/drawing/2010/main" xmlns="" w="9525">
+                <a14:hiddenLine xmlns="" xmlns:a14="http://schemas.microsoft.com/office/drawing/2010/main" w="9525">
                   <a:solidFill>
                     <a:srgbClr val="000000"/>
                   </a:solidFill>
@@ -3028,7 +3077,7 @@
             </a:ln>
             <a:extLst>
               <a:ext uri="{91240B29-F687-4f45-9708-019B960494DF}">
-                <a14:hiddenLine xmlns:a14="http://schemas.microsoft.com/office/drawing/2010/main" xmlns="" w="9525">
+                <a14:hiddenLine xmlns="" xmlns:a14="http://schemas.microsoft.com/office/drawing/2010/main" w="9525">
                   <a:solidFill>
                     <a:srgbClr val="000000"/>
                   </a:solidFill>
@@ -3090,7 +3139,7 @@
             </a:ln>
             <a:extLst>
               <a:ext uri="{91240B29-F687-4f45-9708-019B960494DF}">
-                <a14:hiddenLine xmlns:a14="http://schemas.microsoft.com/office/drawing/2010/main" xmlns="" w="9525">
+                <a14:hiddenLine xmlns="" xmlns:a14="http://schemas.microsoft.com/office/drawing/2010/main" w="9525">
                   <a:solidFill>
                     <a:srgbClr val="000000"/>
                   </a:solidFill>
@@ -3180,7 +3229,7 @@
             </a:ln>
             <a:extLst>
               <a:ext uri="{91240B29-F687-4f45-9708-019B960494DF}">
-                <a14:hiddenLine xmlns:a14="http://schemas.microsoft.com/office/drawing/2010/main" xmlns="" w="9525">
+                <a14:hiddenLine xmlns="" xmlns:a14="http://schemas.microsoft.com/office/drawing/2010/main" w="9525">
                   <a:solidFill>
                     <a:srgbClr val="000000"/>
                   </a:solidFill>
@@ -3214,7 +3263,7 @@
             </a:ln>
             <a:extLst>
               <a:ext uri="{91240B29-F687-4f45-9708-019B960494DF}">
-                <a14:hiddenLine xmlns:a14="http://schemas.microsoft.com/office/drawing/2010/main" xmlns="" w="9525">
+                <a14:hiddenLine xmlns="" xmlns:a14="http://schemas.microsoft.com/office/drawing/2010/main" w="9525">
                   <a:solidFill>
                     <a:srgbClr val="000000"/>
                   </a:solidFill>
@@ -3279,7 +3328,7 @@
             </a:ln>
             <a:extLst>
               <a:ext uri="{91240B29-F687-4f45-9708-019B960494DF}">
-                <a14:hiddenLine xmlns:a14="http://schemas.microsoft.com/office/drawing/2010/main" xmlns="" w="9525">
+                <a14:hiddenLine xmlns="" xmlns:a14="http://schemas.microsoft.com/office/drawing/2010/main" w="9525">
                   <a:solidFill>
                     <a:srgbClr val="000000"/>
                   </a:solidFill>
@@ -3369,7 +3418,7 @@
             </a:ln>
             <a:extLst>
               <a:ext uri="{91240B29-F687-4f45-9708-019B960494DF}">
-                <a14:hiddenLine xmlns:a14="http://schemas.microsoft.com/office/drawing/2010/main" xmlns="" w="9525">
+                <a14:hiddenLine xmlns="" xmlns:a14="http://schemas.microsoft.com/office/drawing/2010/main" w="9525">
                   <a:solidFill>
                     <a:srgbClr val="000000"/>
                   </a:solidFill>
@@ -3431,7 +3480,7 @@
             </a:ln>
             <a:extLst>
               <a:ext uri="{91240B29-F687-4f45-9708-019B960494DF}">
-                <a14:hiddenLine xmlns:a14="http://schemas.microsoft.com/office/drawing/2010/main" xmlns="" w="9525">
+                <a14:hiddenLine xmlns="" xmlns:a14="http://schemas.microsoft.com/office/drawing/2010/main" w="9525">
                   <a:solidFill>
                     <a:srgbClr val="000000"/>
                   </a:solidFill>
@@ -3521,7 +3570,7 @@
             </a:ln>
             <a:extLst>
               <a:ext uri="{91240B29-F687-4f45-9708-019B960494DF}">
-                <a14:hiddenLine xmlns:a14="http://schemas.microsoft.com/office/drawing/2010/main" xmlns="" w="9525">
+                <a14:hiddenLine xmlns="" xmlns:a14="http://schemas.microsoft.com/office/drawing/2010/main" w="9525">
                   <a:solidFill>
                     <a:srgbClr val="000000"/>
                   </a:solidFill>
@@ -3611,7 +3660,7 @@
             </a:ln>
             <a:extLst>
               <a:ext uri="{91240B29-F687-4f45-9708-019B960494DF}">
-                <a14:hiddenLine xmlns:a14="http://schemas.microsoft.com/office/drawing/2010/main" xmlns="" w="9525">
+                <a14:hiddenLine xmlns="" xmlns:a14="http://schemas.microsoft.com/office/drawing/2010/main" w="9525">
                   <a:solidFill>
                     <a:srgbClr val="000000"/>
                   </a:solidFill>
@@ -3676,7 +3725,7 @@
             </a:ln>
             <a:extLst>
               <a:ext uri="{91240B29-F687-4f45-9708-019B960494DF}">
-                <a14:hiddenLine xmlns:a14="http://schemas.microsoft.com/office/drawing/2010/main" xmlns="" w="9525">
+                <a14:hiddenLine xmlns="" xmlns:a14="http://schemas.microsoft.com/office/drawing/2010/main" w="9525">
                   <a:solidFill>
                     <a:srgbClr val="000000"/>
                   </a:solidFill>
@@ -3738,7 +3787,7 @@
             </a:ln>
             <a:extLst>
               <a:ext uri="{91240B29-F687-4f45-9708-019B960494DF}">
-                <a14:hiddenLine xmlns:a14="http://schemas.microsoft.com/office/drawing/2010/main" xmlns="" w="9525">
+                <a14:hiddenLine xmlns="" xmlns:a14="http://schemas.microsoft.com/office/drawing/2010/main" w="9525">
                   <a:solidFill>
                     <a:srgbClr val="000000"/>
                   </a:solidFill>
@@ -3828,7 +3877,7 @@
             </a:ln>
             <a:extLst>
               <a:ext uri="{91240B29-F687-4f45-9708-019B960494DF}">
-                <a14:hiddenLine xmlns:a14="http://schemas.microsoft.com/office/drawing/2010/main" xmlns="" w="9525">
+                <a14:hiddenLine xmlns="" xmlns:a14="http://schemas.microsoft.com/office/drawing/2010/main" w="9525">
                   <a:solidFill>
                     <a:srgbClr val="000000"/>
                   </a:solidFill>
@@ -3918,7 +3967,7 @@
             </a:ln>
             <a:extLst>
               <a:ext uri="{91240B29-F687-4f45-9708-019B960494DF}">
-                <a14:hiddenLine xmlns:a14="http://schemas.microsoft.com/office/drawing/2010/main" xmlns="" w="9525">
+                <a14:hiddenLine xmlns="" xmlns:a14="http://schemas.microsoft.com/office/drawing/2010/main" w="9525">
                   <a:solidFill>
                     <a:srgbClr val="000000"/>
                   </a:solidFill>
@@ -3980,7 +4029,7 @@
             </a:ln>
             <a:extLst>
               <a:ext uri="{91240B29-F687-4f45-9708-019B960494DF}">
-                <a14:hiddenLine xmlns:a14="http://schemas.microsoft.com/office/drawing/2010/main" xmlns="" w="9525">
+                <a14:hiddenLine xmlns="" xmlns:a14="http://schemas.microsoft.com/office/drawing/2010/main" w="9525">
                   <a:solidFill>
                     <a:srgbClr val="000000"/>
                   </a:solidFill>
@@ -4100,7 +4149,7 @@
             </a:ln>
             <a:extLst>
               <a:ext uri="{91240B29-F687-4f45-9708-019B960494DF}">
-                <a14:hiddenLine xmlns:a14="http://schemas.microsoft.com/office/drawing/2010/main" xmlns="" w="9525">
+                <a14:hiddenLine xmlns="" xmlns:a14="http://schemas.microsoft.com/office/drawing/2010/main" w="9525">
                   <a:solidFill>
                     <a:srgbClr val="000000"/>
                   </a:solidFill>
@@ -4168,7 +4217,7 @@
             </a:ln>
             <a:extLst>
               <a:ext uri="{91240B29-F687-4f45-9708-019B960494DF}">
-                <a14:hiddenLine xmlns:a14="http://schemas.microsoft.com/office/drawing/2010/main" xmlns="" w="9525">
+                <a14:hiddenLine xmlns="" xmlns:a14="http://schemas.microsoft.com/office/drawing/2010/main" w="9525">
                   <a:solidFill>
                     <a:srgbClr val="000000"/>
                   </a:solidFill>
@@ -4258,7 +4307,7 @@
             </a:ln>
             <a:extLst>
               <a:ext uri="{91240B29-F687-4f45-9708-019B960494DF}">
-                <a14:hiddenLine xmlns:a14="http://schemas.microsoft.com/office/drawing/2010/main" xmlns="" w="9525">
+                <a14:hiddenLine xmlns="" xmlns:a14="http://schemas.microsoft.com/office/drawing/2010/main" w="9525">
                   <a:solidFill>
                     <a:srgbClr val="000000"/>
                   </a:solidFill>
@@ -4398,7 +4447,7 @@
           <a:p>
             <a:fld id="{48A87A34-81AB-432B-8DAE-1953F412C126}" type="datetimeFigureOut">
               <a:rPr lang="en-US" dirty="0"/>
-              <a:t>10/25/2023</a:t>
+              <a:t>10/26/2023</a:t>
             </a:fld>
             <a:endParaRPr lang="en-US" dirty="0"/>
           </a:p>
@@ -4660,7 +4709,7 @@
           <a:p>
             <a:fld id="{48A87A34-81AB-432B-8DAE-1953F412C126}" type="datetimeFigureOut">
               <a:rPr lang="en-US" dirty="0"/>
-              <a:t>10/25/2023</a:t>
+              <a:t>10/26/2023</a:t>
             </a:fld>
             <a:endParaRPr lang="en-US" dirty="0"/>
           </a:p>
@@ -4851,7 +4900,7 @@
           <a:p>
             <a:fld id="{48A87A34-81AB-432B-8DAE-1953F412C126}" type="datetimeFigureOut">
               <a:rPr lang="en-US" dirty="0"/>
-              <a:t>10/25/2023</a:t>
+              <a:t>10/26/2023</a:t>
             </a:fld>
             <a:endParaRPr lang="en-US" dirty="0"/>
           </a:p>
@@ -5109,7 +5158,7 @@
           <a:p>
             <a:fld id="{48A87A34-81AB-432B-8DAE-1953F412C126}" type="datetimeFigureOut">
               <a:rPr lang="en-US" dirty="0"/>
-              <a:t>10/25/2023</a:t>
+              <a:t>10/26/2023</a:t>
             </a:fld>
             <a:endParaRPr lang="en-US" dirty="0"/>
           </a:p>
@@ -5538,7 +5587,7 @@
           <a:p>
             <a:fld id="{48A87A34-81AB-432B-8DAE-1953F412C126}" type="datetimeFigureOut">
               <a:rPr lang="en-US" dirty="0"/>
-              <a:t>10/25/2023</a:t>
+              <a:t>10/26/2023</a:t>
             </a:fld>
             <a:endParaRPr lang="en-US" dirty="0"/>
           </a:p>
@@ -6079,7 +6128,7 @@
           <a:p>
             <a:fld id="{48A87A34-81AB-432B-8DAE-1953F412C126}" type="datetimeFigureOut">
               <a:rPr lang="en-US" dirty="0"/>
-              <a:t>10/25/2023</a:t>
+              <a:t>10/26/2023</a:t>
             </a:fld>
             <a:endParaRPr lang="en-US" dirty="0"/>
           </a:p>
@@ -6794,7 +6843,7 @@
           <a:p>
             <a:fld id="{48A87A34-81AB-432B-8DAE-1953F412C126}" type="datetimeFigureOut">
               <a:rPr lang="en-US" dirty="0"/>
-              <a:t>10/25/2023</a:t>
+              <a:t>10/26/2023</a:t>
             </a:fld>
             <a:endParaRPr lang="en-US" dirty="0"/>
           </a:p>
@@ -6959,7 +7008,7 @@
           <a:p>
             <a:fld id="{48A87A34-81AB-432B-8DAE-1953F412C126}" type="datetimeFigureOut">
               <a:rPr lang="en-US" dirty="0"/>
-              <a:t>10/25/2023</a:t>
+              <a:t>10/26/2023</a:t>
             </a:fld>
             <a:endParaRPr lang="en-US" dirty="0"/>
           </a:p>
@@ -7134,7 +7183,7 @@
           <a:p>
             <a:fld id="{48A87A34-81AB-432B-8DAE-1953F412C126}" type="datetimeFigureOut">
               <a:rPr lang="en-US" dirty="0"/>
-              <a:t>10/25/2023</a:t>
+              <a:t>10/26/2023</a:t>
             </a:fld>
             <a:endParaRPr lang="en-US" dirty="0"/>
           </a:p>
@@ -7299,7 +7348,7 @@
           <a:p>
             <a:fld id="{48A87A34-81AB-432B-8DAE-1953F412C126}" type="datetimeFigureOut">
               <a:rPr lang="en-US" dirty="0"/>
-              <a:t>10/25/2023</a:t>
+              <a:t>10/26/2023</a:t>
             </a:fld>
             <a:endParaRPr lang="en-US" dirty="0"/>
           </a:p>
@@ -7544,7 +7593,7 @@
           <a:p>
             <a:fld id="{48A87A34-81AB-432B-8DAE-1953F412C126}" type="datetimeFigureOut">
               <a:rPr lang="en-US" dirty="0"/>
-              <a:t>10/25/2023</a:t>
+              <a:t>10/26/2023</a:t>
             </a:fld>
             <a:endParaRPr lang="en-US" dirty="0"/>
           </a:p>
@@ -7771,7 +7820,7 @@
           <a:p>
             <a:fld id="{48A87A34-81AB-432B-8DAE-1953F412C126}" type="datetimeFigureOut">
               <a:rPr lang="en-US" dirty="0"/>
-              <a:t>10/25/2023</a:t>
+              <a:t>10/26/2023</a:t>
             </a:fld>
             <a:endParaRPr lang="en-US" dirty="0"/>
           </a:p>
@@ -8147,7 +8196,7 @@
           <a:p>
             <a:fld id="{48A87A34-81AB-432B-8DAE-1953F412C126}" type="datetimeFigureOut">
               <a:rPr lang="en-US" dirty="0"/>
-              <a:t>10/25/2023</a:t>
+              <a:t>10/26/2023</a:t>
             </a:fld>
             <a:endParaRPr lang="en-US" dirty="0"/>
           </a:p>
@@ -8260,7 +8309,7 @@
           <a:p>
             <a:fld id="{48A87A34-81AB-432B-8DAE-1953F412C126}" type="datetimeFigureOut">
               <a:rPr lang="en-US" dirty="0"/>
-              <a:t>10/25/2023</a:t>
+              <a:t>10/26/2023</a:t>
             </a:fld>
             <a:endParaRPr lang="en-US" dirty="0"/>
           </a:p>
@@ -8350,7 +8399,7 @@
           <a:p>
             <a:fld id="{48A87A34-81AB-432B-8DAE-1953F412C126}" type="datetimeFigureOut">
               <a:rPr lang="en-US" dirty="0"/>
-              <a:t>10/25/2023</a:t>
+              <a:t>10/26/2023</a:t>
             </a:fld>
             <a:endParaRPr lang="en-US" dirty="0"/>
           </a:p>
@@ -8594,7 +8643,7 @@
           <a:p>
             <a:fld id="{48A87A34-81AB-432B-8DAE-1953F412C126}" type="datetimeFigureOut">
               <a:rPr lang="en-US" dirty="0"/>
-              <a:t>10/25/2023</a:t>
+              <a:t>10/26/2023</a:t>
             </a:fld>
             <a:endParaRPr lang="en-US" dirty="0"/>
           </a:p>
@@ -8869,7 +8918,7 @@
           <a:p>
             <a:fld id="{48A87A34-81AB-432B-8DAE-1953F412C126}" type="datetimeFigureOut">
               <a:rPr lang="en-US" dirty="0"/>
-              <a:t>10/25/2023</a:t>
+              <a:t>10/26/2023</a:t>
             </a:fld>
             <a:endParaRPr lang="en-US" dirty="0"/>
           </a:p>
@@ -8987,7 +9036,7 @@
           <a:noFill/>
           <a:extLst>
             <a:ext uri="{909E8E84-426E-40dd-AFC4-6F175D3DCCD1}">
-              <a14:hiddenFill xmlns:a14="http://schemas.microsoft.com/office/drawing/2010/main" xmlns="">
+              <a14:hiddenFill xmlns="" xmlns:a14="http://schemas.microsoft.com/office/drawing/2010/main">
                 <a:solidFill>
                   <a:srgbClr val="FFFFFF"/>
                 </a:solidFill>
@@ -9061,7 +9110,7 @@
               </a:ln>
               <a:extLst>
                 <a:ext uri="{91240B29-F687-4f45-9708-019B960494DF}">
-                  <a14:hiddenLine xmlns:a14="http://schemas.microsoft.com/office/drawing/2010/main" xmlns="" w="9525">
+                  <a14:hiddenLine xmlns="" xmlns:a14="http://schemas.microsoft.com/office/drawing/2010/main" w="9525">
                     <a:solidFill>
                       <a:srgbClr val="000000"/>
                     </a:solidFill>
@@ -9151,7 +9200,7 @@
               </a:ln>
               <a:extLst>
                 <a:ext uri="{91240B29-F687-4f45-9708-019B960494DF}">
-                  <a14:hiddenLine xmlns:a14="http://schemas.microsoft.com/office/drawing/2010/main" xmlns="" w="9525">
+                  <a14:hiddenLine xmlns="" xmlns:a14="http://schemas.microsoft.com/office/drawing/2010/main" w="9525">
                     <a:solidFill>
                       <a:srgbClr val="000000"/>
                     </a:solidFill>
@@ -9241,7 +9290,7 @@
               </a:ln>
               <a:extLst>
                 <a:ext uri="{91240B29-F687-4f45-9708-019B960494DF}">
-                  <a14:hiddenLine xmlns:a14="http://schemas.microsoft.com/office/drawing/2010/main" xmlns="" w="9525">
+                  <a14:hiddenLine xmlns="" xmlns:a14="http://schemas.microsoft.com/office/drawing/2010/main" w="9525">
                     <a:solidFill>
                       <a:srgbClr val="000000"/>
                     </a:solidFill>
@@ -9303,7 +9352,7 @@
               </a:ln>
               <a:extLst>
                 <a:ext uri="{91240B29-F687-4f45-9708-019B960494DF}">
-                  <a14:hiddenLine xmlns:a14="http://schemas.microsoft.com/office/drawing/2010/main" xmlns="" w="9525">
+                  <a14:hiddenLine xmlns="" xmlns:a14="http://schemas.microsoft.com/office/drawing/2010/main" w="9525">
                     <a:solidFill>
                       <a:srgbClr val="000000"/>
                     </a:solidFill>
@@ -9393,7 +9442,7 @@
               </a:ln>
               <a:extLst>
                 <a:ext uri="{91240B29-F687-4f45-9708-019B960494DF}">
-                  <a14:hiddenLine xmlns:a14="http://schemas.microsoft.com/office/drawing/2010/main" xmlns="" w="9525">
+                  <a14:hiddenLine xmlns="" xmlns:a14="http://schemas.microsoft.com/office/drawing/2010/main" w="9525">
                     <a:solidFill>
                       <a:srgbClr val="000000"/>
                     </a:solidFill>
@@ -9455,7 +9504,7 @@
               </a:ln>
               <a:extLst>
                 <a:ext uri="{91240B29-F687-4f45-9708-019B960494DF}">
-                  <a14:hiddenLine xmlns:a14="http://schemas.microsoft.com/office/drawing/2010/main" xmlns="" w="9525">
+                  <a14:hiddenLine xmlns="" xmlns:a14="http://schemas.microsoft.com/office/drawing/2010/main" w="9525">
                     <a:solidFill>
                       <a:srgbClr val="000000"/>
                     </a:solidFill>
@@ -9517,7 +9566,7 @@
               </a:ln>
               <a:extLst>
                 <a:ext uri="{91240B29-F687-4f45-9708-019B960494DF}">
-                  <a14:hiddenLine xmlns:a14="http://schemas.microsoft.com/office/drawing/2010/main" xmlns="" w="9525">
+                  <a14:hiddenLine xmlns="" xmlns:a14="http://schemas.microsoft.com/office/drawing/2010/main" w="9525">
                     <a:solidFill>
                       <a:srgbClr val="000000"/>
                     </a:solidFill>
@@ -9607,7 +9656,7 @@
               </a:ln>
               <a:extLst>
                 <a:ext uri="{91240B29-F687-4f45-9708-019B960494DF}">
-                  <a14:hiddenLine xmlns:a14="http://schemas.microsoft.com/office/drawing/2010/main" xmlns="" w="9525">
+                  <a14:hiddenLine xmlns="" xmlns:a14="http://schemas.microsoft.com/office/drawing/2010/main" w="9525">
                     <a:solidFill>
                       <a:srgbClr val="000000"/>
                     </a:solidFill>
@@ -9697,7 +9746,7 @@
               </a:ln>
               <a:extLst>
                 <a:ext uri="{91240B29-F687-4f45-9708-019B960494DF}">
-                  <a14:hiddenLine xmlns:a14="http://schemas.microsoft.com/office/drawing/2010/main" xmlns="" w="9525">
+                  <a14:hiddenLine xmlns="" xmlns:a14="http://schemas.microsoft.com/office/drawing/2010/main" w="9525">
                     <a:solidFill>
                       <a:srgbClr val="000000"/>
                     </a:solidFill>
@@ -9759,7 +9808,7 @@
               </a:ln>
               <a:extLst>
                 <a:ext uri="{91240B29-F687-4f45-9708-019B960494DF}">
-                  <a14:hiddenLine xmlns:a14="http://schemas.microsoft.com/office/drawing/2010/main" xmlns="" w="9525">
+                  <a14:hiddenLine xmlns="" xmlns:a14="http://schemas.microsoft.com/office/drawing/2010/main" w="9525">
                     <a:solidFill>
                       <a:srgbClr val="000000"/>
                     </a:solidFill>
@@ -9869,7 +9918,7 @@
               </a:ln>
               <a:extLst>
                 <a:ext uri="{91240B29-F687-4f45-9708-019B960494DF}">
-                  <a14:hiddenLine xmlns:a14="http://schemas.microsoft.com/office/drawing/2010/main" xmlns="" w="9525">
+                  <a14:hiddenLine xmlns="" xmlns:a14="http://schemas.microsoft.com/office/drawing/2010/main" w="9525">
                     <a:solidFill>
                       <a:srgbClr val="000000"/>
                     </a:solidFill>
@@ -9953,7 +10002,7 @@
               </a:ln>
               <a:extLst>
                 <a:ext uri="{91240B29-F687-4f45-9708-019B960494DF}">
-                  <a14:hiddenLine xmlns:a14="http://schemas.microsoft.com/office/drawing/2010/main" xmlns="" w="9525">
+                  <a14:hiddenLine xmlns="" xmlns:a14="http://schemas.microsoft.com/office/drawing/2010/main" w="9525">
                     <a:solidFill>
                       <a:srgbClr val="000000"/>
                     </a:solidFill>
@@ -10015,7 +10064,7 @@
               </a:ln>
               <a:extLst>
                 <a:ext uri="{91240B29-F687-4f45-9708-019B960494DF}">
-                  <a14:hiddenLine xmlns:a14="http://schemas.microsoft.com/office/drawing/2010/main" xmlns="" w="9525">
+                  <a14:hiddenLine xmlns="" xmlns:a14="http://schemas.microsoft.com/office/drawing/2010/main" w="9525">
                     <a:solidFill>
                       <a:srgbClr val="000000"/>
                     </a:solidFill>
@@ -10077,7 +10126,7 @@
               </a:ln>
               <a:extLst>
                 <a:ext uri="{91240B29-F687-4f45-9708-019B960494DF}">
-                  <a14:hiddenLine xmlns:a14="http://schemas.microsoft.com/office/drawing/2010/main" xmlns="" w="9525">
+                  <a14:hiddenLine xmlns="" xmlns:a14="http://schemas.microsoft.com/office/drawing/2010/main" w="9525">
                     <a:solidFill>
                       <a:srgbClr val="000000"/>
                     </a:solidFill>
@@ -10167,7 +10216,7 @@
               </a:ln>
               <a:extLst>
                 <a:ext uri="{91240B29-F687-4f45-9708-019B960494DF}">
-                  <a14:hiddenLine xmlns:a14="http://schemas.microsoft.com/office/drawing/2010/main" xmlns="" w="9525">
+                  <a14:hiddenLine xmlns="" xmlns:a14="http://schemas.microsoft.com/office/drawing/2010/main" w="9525">
                     <a:solidFill>
                       <a:srgbClr val="000000"/>
                     </a:solidFill>
@@ -10201,7 +10250,7 @@
               </a:ln>
               <a:extLst>
                 <a:ext uri="{91240B29-F687-4f45-9708-019B960494DF}">
-                  <a14:hiddenLine xmlns:a14="http://schemas.microsoft.com/office/drawing/2010/main" xmlns="" w="9525">
+                  <a14:hiddenLine xmlns="" xmlns:a14="http://schemas.microsoft.com/office/drawing/2010/main" w="9525">
                     <a:solidFill>
                       <a:srgbClr val="000000"/>
                     </a:solidFill>
@@ -10266,7 +10315,7 @@
               </a:ln>
               <a:extLst>
                 <a:ext uri="{91240B29-F687-4f45-9708-019B960494DF}">
-                  <a14:hiddenLine xmlns:a14="http://schemas.microsoft.com/office/drawing/2010/main" xmlns="" w="9525">
+                  <a14:hiddenLine xmlns="" xmlns:a14="http://schemas.microsoft.com/office/drawing/2010/main" w="9525">
                     <a:solidFill>
                       <a:srgbClr val="000000"/>
                     </a:solidFill>
@@ -10356,7 +10405,7 @@
               </a:ln>
               <a:extLst>
                 <a:ext uri="{91240B29-F687-4f45-9708-019B960494DF}">
-                  <a14:hiddenLine xmlns:a14="http://schemas.microsoft.com/office/drawing/2010/main" xmlns="" w="9525">
+                  <a14:hiddenLine xmlns="" xmlns:a14="http://schemas.microsoft.com/office/drawing/2010/main" w="9525">
                     <a:solidFill>
                       <a:srgbClr val="000000"/>
                     </a:solidFill>
@@ -10418,7 +10467,7 @@
               </a:ln>
               <a:extLst>
                 <a:ext uri="{91240B29-F687-4f45-9708-019B960494DF}">
-                  <a14:hiddenLine xmlns:a14="http://schemas.microsoft.com/office/drawing/2010/main" xmlns="" w="9525">
+                  <a14:hiddenLine xmlns="" xmlns:a14="http://schemas.microsoft.com/office/drawing/2010/main" w="9525">
                     <a:solidFill>
                       <a:srgbClr val="000000"/>
                     </a:solidFill>
@@ -10508,7 +10557,7 @@
               </a:ln>
               <a:extLst>
                 <a:ext uri="{91240B29-F687-4f45-9708-019B960494DF}">
-                  <a14:hiddenLine xmlns:a14="http://schemas.microsoft.com/office/drawing/2010/main" xmlns="" w="9525">
+                  <a14:hiddenLine xmlns="" xmlns:a14="http://schemas.microsoft.com/office/drawing/2010/main" w="9525">
                     <a:solidFill>
                       <a:srgbClr val="000000"/>
                     </a:solidFill>
@@ -10573,7 +10622,7 @@
               </a:ln>
               <a:extLst>
                 <a:ext uri="{91240B29-F687-4f45-9708-019B960494DF}">
-                  <a14:hiddenLine xmlns:a14="http://schemas.microsoft.com/office/drawing/2010/main" xmlns="" w="9525">
+                  <a14:hiddenLine xmlns="" xmlns:a14="http://schemas.microsoft.com/office/drawing/2010/main" w="9525">
                     <a:solidFill>
                       <a:srgbClr val="000000"/>
                     </a:solidFill>
@@ -10635,7 +10684,7 @@
               </a:ln>
               <a:extLst>
                 <a:ext uri="{91240B29-F687-4f45-9708-019B960494DF}">
-                  <a14:hiddenLine xmlns:a14="http://schemas.microsoft.com/office/drawing/2010/main" xmlns="" w="9525">
+                  <a14:hiddenLine xmlns="" xmlns:a14="http://schemas.microsoft.com/office/drawing/2010/main" w="9525">
                     <a:solidFill>
                       <a:srgbClr val="000000"/>
                     </a:solidFill>
@@ -10725,7 +10774,7 @@
               </a:ln>
               <a:extLst>
                 <a:ext uri="{91240B29-F687-4f45-9708-019B960494DF}">
-                  <a14:hiddenLine xmlns:a14="http://schemas.microsoft.com/office/drawing/2010/main" xmlns="" w="9525">
+                  <a14:hiddenLine xmlns="" xmlns:a14="http://schemas.microsoft.com/office/drawing/2010/main" w="9525">
                     <a:solidFill>
                       <a:srgbClr val="000000"/>
                     </a:solidFill>
@@ -10815,7 +10864,7 @@
               </a:ln>
               <a:extLst>
                 <a:ext uri="{91240B29-F687-4f45-9708-019B960494DF}">
-                  <a14:hiddenLine xmlns:a14="http://schemas.microsoft.com/office/drawing/2010/main" xmlns="" w="9525">
+                  <a14:hiddenLine xmlns="" xmlns:a14="http://schemas.microsoft.com/office/drawing/2010/main" w="9525">
                     <a:solidFill>
                       <a:srgbClr val="000000"/>
                     </a:solidFill>
@@ -10880,7 +10929,7 @@
               </a:ln>
               <a:extLst>
                 <a:ext uri="{91240B29-F687-4f45-9708-019B960494DF}">
-                  <a14:hiddenLine xmlns:a14="http://schemas.microsoft.com/office/drawing/2010/main" xmlns="" w="9525">
+                  <a14:hiddenLine xmlns="" xmlns:a14="http://schemas.microsoft.com/office/drawing/2010/main" w="9525">
                     <a:solidFill>
                       <a:srgbClr val="000000"/>
                     </a:solidFill>
@@ -11000,7 +11049,7 @@
               </a:ln>
               <a:extLst>
                 <a:ext uri="{91240B29-F687-4f45-9708-019B960494DF}">
-                  <a14:hiddenLine xmlns:a14="http://schemas.microsoft.com/office/drawing/2010/main" xmlns="" w="9525">
+                  <a14:hiddenLine xmlns="" xmlns:a14="http://schemas.microsoft.com/office/drawing/2010/main" w="9525">
                     <a:solidFill>
                       <a:srgbClr val="000000"/>
                     </a:solidFill>
@@ -11081,7 +11130,7 @@
               </a:ln>
               <a:extLst>
                 <a:ext uri="{91240B29-F687-4f45-9708-019B960494DF}">
-                  <a14:hiddenLine xmlns:a14="http://schemas.microsoft.com/office/drawing/2010/main" xmlns="" w="9525">
+                  <a14:hiddenLine xmlns="" xmlns:a14="http://schemas.microsoft.com/office/drawing/2010/main" w="9525">
                     <a:solidFill>
                       <a:srgbClr val="000000"/>
                     </a:solidFill>
@@ -11196,7 +11245,7 @@
               </a:ln>
               <a:extLst>
                 <a:ext uri="{91240B29-F687-4f45-9708-019B960494DF}">
-                  <a14:hiddenLine xmlns:a14="http://schemas.microsoft.com/office/drawing/2010/main" xmlns="" w="9525">
+                  <a14:hiddenLine xmlns="" xmlns:a14="http://schemas.microsoft.com/office/drawing/2010/main" w="9525">
                     <a:solidFill>
                       <a:srgbClr val="000000"/>
                     </a:solidFill>
@@ -11286,7 +11335,7 @@
               </a:ln>
               <a:extLst>
                 <a:ext uri="{91240B29-F687-4f45-9708-019B960494DF}">
-                  <a14:hiddenLine xmlns:a14="http://schemas.microsoft.com/office/drawing/2010/main" xmlns="" w="9525">
+                  <a14:hiddenLine xmlns="" xmlns:a14="http://schemas.microsoft.com/office/drawing/2010/main" w="9525">
                     <a:solidFill>
                       <a:srgbClr val="000000"/>
                     </a:solidFill>
@@ -11351,7 +11400,7 @@
               </a:ln>
               <a:extLst>
                 <a:ext uri="{91240B29-F687-4f45-9708-019B960494DF}">
-                  <a14:hiddenLine xmlns:a14="http://schemas.microsoft.com/office/drawing/2010/main" xmlns="" w="9525">
+                  <a14:hiddenLine xmlns="" xmlns:a14="http://schemas.microsoft.com/office/drawing/2010/main" w="9525">
                     <a:solidFill>
                       <a:srgbClr val="000000"/>
                     </a:solidFill>
@@ -11441,7 +11490,7 @@
               </a:ln>
               <a:extLst>
                 <a:ext uri="{91240B29-F687-4f45-9708-019B960494DF}">
-                  <a14:hiddenLine xmlns:a14="http://schemas.microsoft.com/office/drawing/2010/main" xmlns="" w="9525">
+                  <a14:hiddenLine xmlns="" xmlns:a14="http://schemas.microsoft.com/office/drawing/2010/main" w="9525">
                     <a:solidFill>
                       <a:srgbClr val="000000"/>
                     </a:solidFill>
@@ -11509,7 +11558,7 @@
               </a:ln>
               <a:extLst>
                 <a:ext uri="{91240B29-F687-4f45-9708-019B960494DF}">
-                  <a14:hiddenLine xmlns:a14="http://schemas.microsoft.com/office/drawing/2010/main" xmlns="" w="9525">
+                  <a14:hiddenLine xmlns="" xmlns:a14="http://schemas.microsoft.com/office/drawing/2010/main" w="9525">
                     <a:solidFill>
                       <a:srgbClr val="000000"/>
                     </a:solidFill>
@@ -11599,7 +11648,7 @@
               </a:ln>
               <a:extLst>
                 <a:ext uri="{91240B29-F687-4f45-9708-019B960494DF}">
-                  <a14:hiddenLine xmlns:a14="http://schemas.microsoft.com/office/drawing/2010/main" xmlns="" w="9525">
+                  <a14:hiddenLine xmlns="" xmlns:a14="http://schemas.microsoft.com/office/drawing/2010/main" w="9525">
                     <a:solidFill>
                       <a:srgbClr val="000000"/>
                     </a:solidFill>
@@ -11667,7 +11716,7 @@
               </a:ln>
               <a:extLst>
                 <a:ext uri="{91240B29-F687-4f45-9708-019B960494DF}">
-                  <a14:hiddenLine xmlns:a14="http://schemas.microsoft.com/office/drawing/2010/main" xmlns="" w="9525">
+                  <a14:hiddenLine xmlns="" xmlns:a14="http://schemas.microsoft.com/office/drawing/2010/main" w="9525">
                     <a:solidFill>
                       <a:srgbClr val="000000"/>
                     </a:solidFill>
@@ -11757,7 +11806,7 @@
               </a:ln>
               <a:extLst>
                 <a:ext uri="{91240B29-F687-4f45-9708-019B960494DF}">
-                  <a14:hiddenLine xmlns:a14="http://schemas.microsoft.com/office/drawing/2010/main" xmlns="" w="9525">
+                  <a14:hiddenLine xmlns="" xmlns:a14="http://schemas.microsoft.com/office/drawing/2010/main" w="9525">
                     <a:solidFill>
                       <a:srgbClr val="000000"/>
                     </a:solidFill>
@@ -11791,7 +11840,7 @@
               </a:ln>
               <a:extLst>
                 <a:ext uri="{91240B29-F687-4f45-9708-019B960494DF}">
-                  <a14:hiddenLine xmlns:a14="http://schemas.microsoft.com/office/drawing/2010/main" xmlns="" w="9525">
+                  <a14:hiddenLine xmlns="" xmlns:a14="http://schemas.microsoft.com/office/drawing/2010/main" w="9525">
                     <a:solidFill>
                       <a:srgbClr val="000000"/>
                     </a:solidFill>
@@ -11932,7 +11981,7 @@
             <a:fld id="{48A87A34-81AB-432B-8DAE-1953F412C126}" type="datetimeFigureOut">
               <a:rPr lang="en-US" dirty="0"/>
               <a:pPr/>
-              <a:t>10/25/2023</a:t>
+              <a:t>10/26/2023</a:t>
             </a:fld>
             <a:endParaRPr lang="en-US" dirty="0"/>
           </a:p>
@@ -12444,13 +12493,13 @@
   <p:clrMapOvr>
     <a:masterClrMapping/>
   </p:clrMapOvr>
-  <mc:AlternateContent xmlns:mc="http://schemas.openxmlformats.org/markup-compatibility/2006">
-    <mc:Choice xmlns:p14="http://schemas.microsoft.com/office/powerpoint/2010/main" Requires="p14">
+  <mc:AlternateContent xmlns:mc="http://schemas.openxmlformats.org/markup-compatibility/2006" xmlns:p14="http://schemas.microsoft.com/office/powerpoint/2010/main">
+    <mc:Choice Requires="p14">
       <p:transition spd="slow" p14:dur="3400">
         <p14:reveal/>
       </p:transition>
     </mc:Choice>
-    <mc:Fallback>
+    <mc:Fallback xmlns="">
       <p:transition spd="slow">
         <p:fade/>
       </p:transition>
@@ -12540,13 +12589,13 @@
   <p:clrMapOvr>
     <a:masterClrMapping/>
   </p:clrMapOvr>
-  <mc:AlternateContent xmlns:mc="http://schemas.openxmlformats.org/markup-compatibility/2006">
-    <mc:Choice xmlns:p14="http://schemas.microsoft.com/office/powerpoint/2010/main" Requires="p14">
+  <mc:AlternateContent xmlns:mc="http://schemas.openxmlformats.org/markup-compatibility/2006" xmlns:p14="http://schemas.microsoft.com/office/powerpoint/2010/main">
+    <mc:Choice Requires="p14">
       <p:transition spd="med" p14:dur="700">
         <p:fade/>
       </p:transition>
     </mc:Choice>
-    <mc:Fallback>
+    <mc:Fallback xmlns="">
       <p:transition spd="med">
         <p:fade/>
       </p:transition>
@@ -12669,7 +12718,7 @@
           <a:p>
             <a:r>
               <a:rPr lang="en-AU" dirty="0"/>
-              <a:t>To implement a PID controller to manipulate movement of Turtlebot to goal.</a:t>
+              <a:t>To implement a PD controller to manipulate movement of Turtlebot to goal.</a:t>
             </a:r>
             <a:endParaRPr lang="en-US" dirty="0"/>
           </a:p>
@@ -12786,13 +12835,13 @@
   <p:clrMapOvr>
     <a:masterClrMapping/>
   </p:clrMapOvr>
-  <mc:AlternateContent xmlns:mc="http://schemas.openxmlformats.org/markup-compatibility/2006">
-    <mc:Choice xmlns:p14="http://schemas.microsoft.com/office/powerpoint/2010/main" Requires="p14">
+  <mc:AlternateContent xmlns:mc="http://schemas.openxmlformats.org/markup-compatibility/2006" xmlns:p14="http://schemas.microsoft.com/office/powerpoint/2010/main">
+    <mc:Choice Requires="p14">
       <p:transition spd="med" p14:dur="700">
         <p:fade/>
       </p:transition>
     </mc:Choice>
-    <mc:Fallback>
+    <mc:Fallback xmlns="">
       <p:transition spd="med">
         <p:fade/>
       </p:transition>
@@ -12887,13 +12936,13 @@
   <p:clrMapOvr>
     <a:masterClrMapping/>
   </p:clrMapOvr>
-  <mc:AlternateContent xmlns:mc="http://schemas.openxmlformats.org/markup-compatibility/2006">
-    <mc:Choice xmlns:p14="http://schemas.microsoft.com/office/powerpoint/2010/main" Requires="p14">
+  <mc:AlternateContent xmlns:mc="http://schemas.openxmlformats.org/markup-compatibility/2006" xmlns:p14="http://schemas.microsoft.com/office/powerpoint/2010/main">
+    <mc:Choice Requires="p14">
       <p:transition spd="med" p14:dur="700">
         <p:fade/>
       </p:transition>
     </mc:Choice>
-    <mc:Fallback>
+    <mc:Fallback xmlns="">
       <p:transition spd="med">
         <p:fade/>
       </p:transition>
@@ -13052,8 +13101,12 @@
               <a:buAutoNum type="arabicPeriod"/>
             </a:pPr>
             <a:r>
+              <a:rPr lang="en-AU"/>
+              <a:t>PD </a:t>
+            </a:r>
+            <a:r>
               <a:rPr lang="en-AU" dirty="0"/>
-              <a:t>PID Controller </a:t>
+              <a:t>Controller </a:t>
             </a:r>
           </a:p>
           <a:p>
@@ -13112,13 +13165,13 @@
   <p:clrMapOvr>
     <a:masterClrMapping/>
   </p:clrMapOvr>
-  <mc:AlternateContent xmlns:mc="http://schemas.openxmlformats.org/markup-compatibility/2006">
-    <mc:Choice xmlns:p14="http://schemas.microsoft.com/office/powerpoint/2010/main" Requires="p14">
+  <mc:AlternateContent xmlns:mc="http://schemas.openxmlformats.org/markup-compatibility/2006" xmlns:p14="http://schemas.microsoft.com/office/powerpoint/2010/main">
+    <mc:Choice Requires="p14">
       <p:transition spd="med" p14:dur="700">
         <p:fade/>
       </p:transition>
     </mc:Choice>
-    <mc:Fallback>
+    <mc:Fallback xmlns="">
       <p:transition spd="med">
         <p:fade/>
       </p:transition>
@@ -13229,13 +13282,13 @@
   <p:clrMapOvr>
     <a:masterClrMapping/>
   </p:clrMapOvr>
-  <mc:AlternateContent xmlns:mc="http://schemas.openxmlformats.org/markup-compatibility/2006">
-    <mc:Choice xmlns:p14="http://schemas.microsoft.com/office/powerpoint/2010/main" Requires="p14">
+  <mc:AlternateContent xmlns:mc="http://schemas.openxmlformats.org/markup-compatibility/2006" xmlns:p14="http://schemas.microsoft.com/office/powerpoint/2010/main">
+    <mc:Choice Requires="p14">
       <p:transition spd="med" p14:dur="700">
         <p:fade/>
       </p:transition>
     </mc:Choice>
-    <mc:Fallback>
+    <mc:Fallback xmlns="">
       <p:transition spd="med">
         <p:fade/>
       </p:transition>
@@ -13579,13 +13632,13 @@
   <p:clrMapOvr>
     <a:masterClrMapping/>
   </p:clrMapOvr>
-  <mc:AlternateContent xmlns:mc="http://schemas.openxmlformats.org/markup-compatibility/2006">
-    <mc:Choice xmlns:p14="http://schemas.microsoft.com/office/powerpoint/2010/main" Requires="p14">
+  <mc:AlternateContent xmlns:mc="http://schemas.openxmlformats.org/markup-compatibility/2006" xmlns:p14="http://schemas.microsoft.com/office/powerpoint/2010/main">
+    <mc:Choice Requires="p14">
       <p:transition spd="med" p14:dur="700">
         <p:fade/>
       </p:transition>
     </mc:Choice>
-    <mc:Fallback>
+    <mc:Fallback xmlns="">
       <p:transition spd="med">
         <p:fade/>
       </p:transition>
@@ -13697,13 +13750,13 @@
   <p:clrMapOvr>
     <a:masterClrMapping/>
   </p:clrMapOvr>
-  <mc:AlternateContent xmlns:mc="http://schemas.openxmlformats.org/markup-compatibility/2006">
-    <mc:Choice xmlns:p14="http://schemas.microsoft.com/office/powerpoint/2010/main" Requires="p14">
+  <mc:AlternateContent xmlns:mc="http://schemas.openxmlformats.org/markup-compatibility/2006" xmlns:p14="http://schemas.microsoft.com/office/powerpoint/2010/main">
+    <mc:Choice Requires="p14">
       <p:transition spd="med" p14:dur="700">
         <p:fade/>
       </p:transition>
     </mc:Choice>
-    <mc:Fallback>
+    <mc:Fallback xmlns="">
       <p:transition spd="med">
         <p:fade/>
       </p:transition>
@@ -13773,13 +13826,13 @@
   <p:clrMapOvr>
     <a:masterClrMapping/>
   </p:clrMapOvr>
-  <mc:AlternateContent xmlns:mc="http://schemas.openxmlformats.org/markup-compatibility/2006">
-    <mc:Choice xmlns:p14="http://schemas.microsoft.com/office/powerpoint/2010/main" Requires="p14">
+  <mc:AlternateContent xmlns:mc="http://schemas.openxmlformats.org/markup-compatibility/2006" xmlns:p14="http://schemas.microsoft.com/office/powerpoint/2010/main">
+    <mc:Choice Requires="p14">
       <p:transition spd="med" p14:dur="700">
         <p:fade/>
       </p:transition>
     </mc:Choice>
-    <mc:Fallback>
+    <mc:Fallback xmlns="">
       <p:transition spd="med">
         <p:fade/>
       </p:transition>
@@ -13888,13 +13941,13 @@
   <p:clrMapOvr>
     <a:masterClrMapping/>
   </p:clrMapOvr>
-  <mc:AlternateContent xmlns:mc="http://schemas.openxmlformats.org/markup-compatibility/2006">
-    <mc:Choice xmlns:p14="http://schemas.microsoft.com/office/powerpoint/2010/main" Requires="p14">
+  <mc:AlternateContent xmlns:mc="http://schemas.openxmlformats.org/markup-compatibility/2006" xmlns:p14="http://schemas.microsoft.com/office/powerpoint/2010/main">
+    <mc:Choice Requires="p14">
       <p:transition spd="med" p14:dur="700">
         <p:fade/>
       </p:transition>
     </mc:Choice>
-    <mc:Fallback>
+    <mc:Fallback xmlns="">
       <p:transition spd="med">
         <p:fade/>
       </p:transition>

</xml_diff>